<commit_message>
Cleaned version of latex
</commit_message>
<xml_diff>
--- a/Reports/Final Project/Project Presentation.pptx
+++ b/Reports/Final Project/Project Presentation.pptx
@@ -5,10 +5,10 @@
     <p:sldMasterId id="2147483696" r:id="rId1"/>
   </p:sldMasterIdLst>
   <p:notesMasterIdLst>
-    <p:notesMasterId r:id="rId22"/>
+    <p:notesMasterId r:id="rId23"/>
   </p:notesMasterIdLst>
   <p:handoutMasterIdLst>
-    <p:handoutMasterId r:id="rId23"/>
+    <p:handoutMasterId r:id="rId24"/>
   </p:handoutMasterIdLst>
   <p:sldIdLst>
     <p:sldId id="256" r:id="rId2"/>
@@ -17,20 +17,21 @@
     <p:sldId id="487" r:id="rId5"/>
     <p:sldId id="488" r:id="rId6"/>
     <p:sldId id="489" r:id="rId7"/>
-    <p:sldId id="492" r:id="rId8"/>
-    <p:sldId id="505" r:id="rId9"/>
-    <p:sldId id="493" r:id="rId10"/>
-    <p:sldId id="497" r:id="rId11"/>
-    <p:sldId id="494" r:id="rId12"/>
-    <p:sldId id="498" r:id="rId13"/>
-    <p:sldId id="502" r:id="rId14"/>
-    <p:sldId id="503" r:id="rId15"/>
-    <p:sldId id="504" r:id="rId16"/>
-    <p:sldId id="495" r:id="rId17"/>
-    <p:sldId id="499" r:id="rId18"/>
-    <p:sldId id="496" r:id="rId19"/>
-    <p:sldId id="506" r:id="rId20"/>
-    <p:sldId id="507" r:id="rId21"/>
+    <p:sldId id="508" r:id="rId8"/>
+    <p:sldId id="492" r:id="rId9"/>
+    <p:sldId id="505" r:id="rId10"/>
+    <p:sldId id="493" r:id="rId11"/>
+    <p:sldId id="497" r:id="rId12"/>
+    <p:sldId id="494" r:id="rId13"/>
+    <p:sldId id="498" r:id="rId14"/>
+    <p:sldId id="502" r:id="rId15"/>
+    <p:sldId id="503" r:id="rId16"/>
+    <p:sldId id="504" r:id="rId17"/>
+    <p:sldId id="495" r:id="rId18"/>
+    <p:sldId id="499" r:id="rId19"/>
+    <p:sldId id="496" r:id="rId20"/>
+    <p:sldId id="506" r:id="rId21"/>
+    <p:sldId id="507" r:id="rId22"/>
   </p:sldIdLst>
   <p:sldSz cx="9144000" cy="6858000" type="screen4x3"/>
   <p:notesSz cx="6858000" cy="9296400"/>
@@ -5868,10 +5869,48 @@
           </a:p>
         </p:txBody>
       </p:sp>
+      <p:sp>
+        <p:nvSpPr>
+          <p:cNvPr id="4" name="Rectangle 3"/>
+          <p:cNvSpPr/>
+          <p:nvPr/>
+        </p:nvSpPr>
+        <p:spPr>
+          <a:xfrm>
+            <a:off x="4644008" y="5796553"/>
+            <a:ext cx="4206315" cy="584775"/>
+          </a:xfrm>
+          <a:prstGeom prst="rect">
+            <a:avLst/>
+          </a:prstGeom>
+        </p:spPr>
+        <p:txBody>
+          <a:bodyPr wrap="square">
+            <a:spAutoFit/>
+          </a:bodyPr>
+          <a:lstStyle/>
+          <a:p>
+            <a:pPr lvl="0" algn="r"/>
+            <a:r>
+              <a:rPr lang="en-US" sz="3200" b="1" dirty="0" smtClean="0">
+                <a:solidFill>
+                  <a:srgbClr val="00477A"/>
+                </a:solidFill>
+              </a:rPr>
+              <a:t>SOFTWARE</a:t>
+            </a:r>
+            <a:endParaRPr lang="en-US" sz="3200" b="1" dirty="0">
+              <a:solidFill>
+                <a:srgbClr val="00477A"/>
+              </a:solidFill>
+            </a:endParaRPr>
+          </a:p>
+        </p:txBody>
+      </p:sp>
     </p:spTree>
     <p:extLst>
       <p:ext uri="{BB962C8B-B14F-4D97-AF65-F5344CB8AC3E}">
-        <p14:creationId xmlns:p14="http://schemas.microsoft.com/office/powerpoint/2010/main" val="846838779"/>
+        <p14:creationId xmlns:p14="http://schemas.microsoft.com/office/powerpoint/2010/main" val="991665235"/>
       </p:ext>
     </p:extLst>
   </p:cSld>
@@ -5936,48 +5975,10 @@
           </a:p>
         </p:txBody>
       </p:sp>
-      <p:sp>
-        <p:nvSpPr>
-          <p:cNvPr id="4" name="Rectangle 3"/>
-          <p:cNvSpPr/>
-          <p:nvPr/>
-        </p:nvSpPr>
-        <p:spPr>
-          <a:xfrm>
-            <a:off x="4644008" y="5796553"/>
-            <a:ext cx="4206315" cy="584775"/>
-          </a:xfrm>
-          <a:prstGeom prst="rect">
-            <a:avLst/>
-          </a:prstGeom>
-        </p:spPr>
-        <p:txBody>
-          <a:bodyPr wrap="square">
-            <a:spAutoFit/>
-          </a:bodyPr>
-          <a:lstStyle/>
-          <a:p>
-            <a:pPr lvl="0" algn="r"/>
-            <a:r>
-              <a:rPr lang="en-US" sz="3200" b="1" dirty="0" smtClean="0">
-                <a:solidFill>
-                  <a:srgbClr val="00477A"/>
-                </a:solidFill>
-              </a:rPr>
-              <a:t>MODELING</a:t>
-            </a:r>
-            <a:endParaRPr lang="en-US" sz="3200" b="1" dirty="0">
-              <a:solidFill>
-                <a:srgbClr val="00477A"/>
-              </a:solidFill>
-            </a:endParaRPr>
-          </a:p>
-        </p:txBody>
-      </p:sp>
     </p:spTree>
     <p:extLst>
       <p:ext uri="{BB962C8B-B14F-4D97-AF65-F5344CB8AC3E}">
-        <p14:creationId xmlns:p14="http://schemas.microsoft.com/office/powerpoint/2010/main" val="1457665581"/>
+        <p14:creationId xmlns:p14="http://schemas.microsoft.com/office/powerpoint/2010/main" val="846838779"/>
       </p:ext>
     </p:extLst>
   </p:cSld>
@@ -6019,11 +6020,7 @@
           <a:bodyPr/>
           <a:lstStyle/>
           <a:p>
-            <a:r>
-              <a:rPr lang="en-US" dirty="0" smtClean="0"/>
-              <a:t>Classification</a:t>
-            </a:r>
-            <a:endParaRPr lang="en-US" dirty="0"/>
+            <a:endParaRPr lang="en-US"/>
           </a:p>
         </p:txBody>
       </p:sp>
@@ -6042,139 +6039,52 @@
           <a:bodyPr/>
           <a:lstStyle/>
           <a:p>
-            <a:r>
-              <a:rPr lang="en-US" dirty="0" smtClean="0"/>
-              <a:t>We have </a:t>
-            </a:r>
-            <a:r>
-              <a:rPr lang="en-US" dirty="0" err="1" smtClean="0"/>
-              <a:t>X</a:t>
-            </a:r>
-            <a:r>
-              <a:rPr lang="en-US" baseline="30000" dirty="0" err="1" smtClean="0"/>
-              <a:t>n</a:t>
-            </a:r>
-            <a:r>
-              <a:rPr lang="en-US" dirty="0" smtClean="0"/>
-              <a:t> </a:t>
-            </a:r>
-            <a:r>
-              <a:rPr lang="en-US" dirty="0" smtClean="0"/>
-              <a:t>data from </a:t>
-            </a:r>
-            <a:r>
-              <a:rPr lang="en-US" i="1" dirty="0" smtClean="0"/>
-              <a:t>n</a:t>
-            </a:r>
-            <a:r>
-              <a:rPr lang="en-US" dirty="0" smtClean="0"/>
-              <a:t> </a:t>
-            </a:r>
-            <a:r>
-              <a:rPr lang="en-US" dirty="0" smtClean="0"/>
-              <a:t>sensors in a window t.</a:t>
-            </a:r>
-            <a:endParaRPr lang="en-US" dirty="0" smtClean="0"/>
-          </a:p>
-          <a:p>
-            <a:pPr lvl="1"/>
-            <a:r>
-              <a:rPr lang="en-US" dirty="0"/>
-              <a:t>e</a:t>
-            </a:r>
-            <a:r>
-              <a:rPr lang="en-US" dirty="0" smtClean="0"/>
-              <a:t>ach X is data from a sensor for a window time </a:t>
-            </a:r>
-            <a:r>
-              <a:rPr lang="en-US" i="1" dirty="0" smtClean="0"/>
-              <a:t>t</a:t>
-            </a:r>
-            <a:r>
-              <a:rPr lang="en-US" dirty="0" smtClean="0"/>
-              <a:t>.</a:t>
-            </a:r>
-          </a:p>
-          <a:p>
-            <a:pPr lvl="1"/>
-            <a:r>
-              <a:rPr lang="en-US" dirty="0"/>
-              <a:t>e</a:t>
-            </a:r>
-            <a:r>
-              <a:rPr lang="en-US" dirty="0" smtClean="0"/>
-              <a:t>ach </a:t>
-            </a:r>
-            <a:r>
-              <a:rPr lang="en-US" dirty="0"/>
-              <a:t>X </a:t>
-            </a:r>
-            <a:r>
-              <a:rPr lang="en-US" dirty="0" smtClean="0"/>
-              <a:t>represents a nominal feature y drawn from Y.</a:t>
-            </a:r>
-          </a:p>
-          <a:p>
-            <a:endParaRPr lang="en-US" dirty="0" smtClean="0"/>
-          </a:p>
-          <a:p>
-            <a:r>
-              <a:rPr lang="en-US" dirty="0" smtClean="0"/>
-              <a:t>Problem: Find y that suits </a:t>
-            </a:r>
-            <a:r>
-              <a:rPr lang="en-US" dirty="0" smtClean="0"/>
-              <a:t>a given </a:t>
-            </a:r>
-            <a:r>
-              <a:rPr lang="en-US" dirty="0" err="1" smtClean="0"/>
-              <a:t>X</a:t>
-            </a:r>
-            <a:r>
-              <a:rPr lang="en-US" baseline="30000" dirty="0" err="1" smtClean="0"/>
-              <a:t>n</a:t>
-            </a:r>
-            <a:r>
-              <a:rPr lang="en-US" dirty="0" smtClean="0"/>
-              <a:t> </a:t>
-            </a:r>
-            <a:r>
-              <a:rPr lang="en-US" dirty="0" smtClean="0"/>
-              <a:t>(</a:t>
-            </a:r>
-            <a:r>
-              <a:rPr lang="en-US" i="1" dirty="0" smtClean="0"/>
-              <a:t>classification</a:t>
-            </a:r>
-            <a:r>
-              <a:rPr lang="en-US" dirty="0" smtClean="0"/>
-              <a:t>). </a:t>
-            </a:r>
-          </a:p>
-          <a:p>
-            <a:endParaRPr lang="en-US" dirty="0" smtClean="0"/>
-          </a:p>
-          <a:p>
-            <a:endParaRPr lang="en-US" dirty="0"/>
-          </a:p>
-          <a:p>
-            <a:endParaRPr lang="en-US" dirty="0"/>
-          </a:p>
-          <a:p>
-            <a:pPr marL="0" indent="0">
-              <a:buNone/>
-            </a:pPr>
-            <a:endParaRPr lang="en-US" dirty="0" smtClean="0"/>
-          </a:p>
-          <a:p>
-            <a:endParaRPr lang="en-US" dirty="0"/>
+            <a:endParaRPr lang="en-US"/>
+          </a:p>
+        </p:txBody>
+      </p:sp>
+      <p:sp>
+        <p:nvSpPr>
+          <p:cNvPr id="4" name="Rectangle 3"/>
+          <p:cNvSpPr/>
+          <p:nvPr/>
+        </p:nvSpPr>
+        <p:spPr>
+          <a:xfrm>
+            <a:off x="4644008" y="5796553"/>
+            <a:ext cx="4206315" cy="584775"/>
+          </a:xfrm>
+          <a:prstGeom prst="rect">
+            <a:avLst/>
+          </a:prstGeom>
+        </p:spPr>
+        <p:txBody>
+          <a:bodyPr wrap="square">
+            <a:spAutoFit/>
+          </a:bodyPr>
+          <a:lstStyle/>
+          <a:p>
+            <a:pPr lvl="0" algn="r"/>
+            <a:r>
+              <a:rPr lang="en-US" sz="3200" b="1" dirty="0" smtClean="0">
+                <a:solidFill>
+                  <a:srgbClr val="00477A"/>
+                </a:solidFill>
+              </a:rPr>
+              <a:t>MODELING</a:t>
+            </a:r>
+            <a:endParaRPr lang="en-US" sz="3200" b="1" dirty="0">
+              <a:solidFill>
+                <a:srgbClr val="00477A"/>
+              </a:solidFill>
+            </a:endParaRPr>
           </a:p>
         </p:txBody>
       </p:sp>
     </p:spTree>
     <p:extLst>
       <p:ext uri="{BB962C8B-B14F-4D97-AF65-F5344CB8AC3E}">
-        <p14:creationId xmlns:p14="http://schemas.microsoft.com/office/powerpoint/2010/main" val="1070278340"/>
+        <p14:creationId xmlns:p14="http://schemas.microsoft.com/office/powerpoint/2010/main" val="1457665581"/>
       </p:ext>
     </p:extLst>
   </p:cSld>
@@ -6244,6 +6154,186 @@
               <a:t>We have </a:t>
             </a:r>
             <a:r>
+              <a:rPr lang="en-US" dirty="0" err="1" smtClean="0"/>
+              <a:t>X</a:t>
+            </a:r>
+            <a:r>
+              <a:rPr lang="en-US" baseline="30000" dirty="0" err="1" smtClean="0"/>
+              <a:t>n</a:t>
+            </a:r>
+            <a:r>
+              <a:rPr lang="en-US" dirty="0" smtClean="0"/>
+              <a:t> data from </a:t>
+            </a:r>
+            <a:r>
+              <a:rPr lang="en-US" i="1" dirty="0" smtClean="0"/>
+              <a:t>n</a:t>
+            </a:r>
+            <a:r>
+              <a:rPr lang="en-US" dirty="0" smtClean="0"/>
+              <a:t> sensors in a window t.</a:t>
+            </a:r>
+          </a:p>
+          <a:p>
+            <a:pPr lvl="1"/>
+            <a:r>
+              <a:rPr lang="en-US" dirty="0"/>
+              <a:t>e</a:t>
+            </a:r>
+            <a:r>
+              <a:rPr lang="en-US" dirty="0" smtClean="0"/>
+              <a:t>ach X is data from a sensor for a window time </a:t>
+            </a:r>
+            <a:r>
+              <a:rPr lang="en-US" i="1" dirty="0" smtClean="0"/>
+              <a:t>t</a:t>
+            </a:r>
+            <a:r>
+              <a:rPr lang="en-US" dirty="0" smtClean="0"/>
+              <a:t>.</a:t>
+            </a:r>
+          </a:p>
+          <a:p>
+            <a:pPr lvl="1"/>
+            <a:r>
+              <a:rPr lang="en-US" dirty="0"/>
+              <a:t>e</a:t>
+            </a:r>
+            <a:r>
+              <a:rPr lang="en-US" dirty="0" smtClean="0"/>
+              <a:t>ach </a:t>
+            </a:r>
+            <a:r>
+              <a:rPr lang="en-US" dirty="0"/>
+              <a:t>X </a:t>
+            </a:r>
+            <a:r>
+              <a:rPr lang="en-US" dirty="0" smtClean="0"/>
+              <a:t>represents a nominal feature y drawn from Y.</a:t>
+            </a:r>
+          </a:p>
+          <a:p>
+            <a:endParaRPr lang="en-US" dirty="0" smtClean="0"/>
+          </a:p>
+          <a:p>
+            <a:r>
+              <a:rPr lang="en-US" dirty="0" smtClean="0"/>
+              <a:t>Problem: Find y that suits a given </a:t>
+            </a:r>
+            <a:r>
+              <a:rPr lang="en-US" dirty="0" err="1" smtClean="0"/>
+              <a:t>X</a:t>
+            </a:r>
+            <a:r>
+              <a:rPr lang="en-US" baseline="30000" dirty="0" err="1" smtClean="0"/>
+              <a:t>n</a:t>
+            </a:r>
+            <a:r>
+              <a:rPr lang="en-US" dirty="0" smtClean="0"/>
+              <a:t> (</a:t>
+            </a:r>
+            <a:r>
+              <a:rPr lang="en-US" i="1" dirty="0" smtClean="0"/>
+              <a:t>classification</a:t>
+            </a:r>
+            <a:r>
+              <a:rPr lang="en-US" dirty="0" smtClean="0"/>
+              <a:t>). </a:t>
+            </a:r>
+          </a:p>
+          <a:p>
+            <a:endParaRPr lang="en-US" dirty="0" smtClean="0"/>
+          </a:p>
+          <a:p>
+            <a:endParaRPr lang="en-US" dirty="0"/>
+          </a:p>
+          <a:p>
+            <a:endParaRPr lang="en-US" dirty="0"/>
+          </a:p>
+          <a:p>
+            <a:pPr marL="0" indent="0">
+              <a:buNone/>
+            </a:pPr>
+            <a:endParaRPr lang="en-US" dirty="0" smtClean="0"/>
+          </a:p>
+          <a:p>
+            <a:endParaRPr lang="en-US" dirty="0"/>
+          </a:p>
+        </p:txBody>
+      </p:sp>
+    </p:spTree>
+    <p:extLst>
+      <p:ext uri="{BB962C8B-B14F-4D97-AF65-F5344CB8AC3E}">
+        <p14:creationId xmlns:p14="http://schemas.microsoft.com/office/powerpoint/2010/main" val="1070278340"/>
+      </p:ext>
+    </p:extLst>
+  </p:cSld>
+  <p:clrMapOvr>
+    <a:masterClrMapping/>
+  </p:clrMapOvr>
+</p:sld>
+</file>
+
+<file path=ppt/slides/slide14.xml><?xml version="1.0" encoding="utf-8"?>
+<p:sld xmlns:a="http://schemas.openxmlformats.org/drawingml/2006/main" xmlns:r="http://schemas.openxmlformats.org/officeDocument/2006/relationships" xmlns:p="http://schemas.openxmlformats.org/presentationml/2006/main">
+  <p:cSld>
+    <p:spTree>
+      <p:nvGrpSpPr>
+        <p:cNvPr id="1" name=""/>
+        <p:cNvGrpSpPr/>
+        <p:nvPr/>
+      </p:nvGrpSpPr>
+      <p:grpSpPr>
+        <a:xfrm>
+          <a:off x="0" y="0"/>
+          <a:ext cx="0" cy="0"/>
+          <a:chOff x="0" y="0"/>
+          <a:chExt cx="0" cy="0"/>
+        </a:xfrm>
+      </p:grpSpPr>
+      <p:sp>
+        <p:nvSpPr>
+          <p:cNvPr id="2" name="Title 1"/>
+          <p:cNvSpPr>
+            <a:spLocks noGrp="1"/>
+          </p:cNvSpPr>
+          <p:nvPr>
+            <p:ph type="title"/>
+          </p:nvPr>
+        </p:nvSpPr>
+        <p:spPr/>
+        <p:txBody>
+          <a:bodyPr/>
+          <a:lstStyle/>
+          <a:p>
+            <a:r>
+              <a:rPr lang="en-US" dirty="0" smtClean="0"/>
+              <a:t>Classification</a:t>
+            </a:r>
+            <a:endParaRPr lang="en-US" dirty="0"/>
+          </a:p>
+        </p:txBody>
+      </p:sp>
+      <p:sp>
+        <p:nvSpPr>
+          <p:cNvPr id="3" name="Content Placeholder 2"/>
+          <p:cNvSpPr>
+            <a:spLocks noGrp="1"/>
+          </p:cNvSpPr>
+          <p:nvPr>
+            <p:ph idx="1"/>
+          </p:nvPr>
+        </p:nvSpPr>
+        <p:spPr/>
+        <p:txBody>
+          <a:bodyPr/>
+          <a:lstStyle/>
+          <a:p>
+            <a:r>
+              <a:rPr lang="en-US" dirty="0" smtClean="0"/>
+              <a:t>We have </a:t>
+            </a:r>
+            <a:r>
               <a:rPr lang="en-US" i="1" dirty="0" err="1" smtClean="0"/>
               <a:t>X</a:t>
             </a:r>
@@ -6265,8 +6355,21 @@
             </a:r>
             <a:r>
               <a:rPr lang="en-US" dirty="0" smtClean="0"/>
-              <a:t> sensors.</a:t>
-            </a:r>
+              <a:t> </a:t>
+            </a:r>
+            <a:r>
+              <a:rPr lang="en-US" dirty="0" smtClean="0"/>
+              <a:t>sensors at window time </a:t>
+            </a:r>
+            <a:r>
+              <a:rPr lang="en-US" i="1" dirty="0" smtClean="0"/>
+              <a:t>w</a:t>
+            </a:r>
+            <a:r>
+              <a:rPr lang="en-US" dirty="0" smtClean="0"/>
+              <a:t>.</a:t>
+            </a:r>
+            <a:endParaRPr lang="en-US" dirty="0" smtClean="0"/>
           </a:p>
           <a:p>
             <a:pPr lvl="1"/>
@@ -6284,7 +6387,19 @@
             </a:r>
             <a:r>
               <a:rPr lang="en-US" dirty="0" smtClean="0"/>
-              <a:t> is data from a sensor for a window time </a:t>
+              <a:t> is data from </a:t>
+            </a:r>
+            <a:r>
+              <a:rPr lang="en-US" dirty="0" smtClean="0"/>
+              <a:t>sensors </a:t>
+            </a:r>
+            <a:r>
+              <a:rPr lang="en-US" dirty="0" smtClean="0"/>
+              <a:t>at </a:t>
+            </a:r>
+            <a:r>
+              <a:rPr lang="en-US" dirty="0" smtClean="0"/>
+              <a:t>time </a:t>
             </a:r>
             <a:r>
               <a:rPr lang="en-US" i="1" dirty="0" smtClean="0"/>
@@ -6348,11 +6463,7 @@
             </a:r>
             <a:r>
               <a:rPr lang="en-US" dirty="0" smtClean="0"/>
-              <a:t> that suits </a:t>
-            </a:r>
-            <a:r>
-              <a:rPr lang="en-US" dirty="0" smtClean="0"/>
-              <a:t>a </a:t>
+              <a:t> that suits a </a:t>
             </a:r>
             <a:r>
               <a:rPr lang="en-US" dirty="0"/>
@@ -6368,11 +6479,7 @@
             </a:r>
             <a:r>
               <a:rPr lang="en-US" dirty="0" smtClean="0"/>
-              <a:t> </a:t>
-            </a:r>
-            <a:r>
-              <a:rPr lang="en-US" dirty="0" smtClean="0"/>
-              <a:t>(</a:t>
+              <a:t> (</a:t>
             </a:r>
             <a:r>
               <a:rPr lang="en-US" i="1" dirty="0" smtClean="0"/>
@@ -6492,7 +6599,7 @@
 </p:sld>
 </file>
 
-<file path=ppt/slides/slide14.xml><?xml version="1.0" encoding="utf-8"?>
+<file path=ppt/slides/slide15.xml><?xml version="1.0" encoding="utf-8"?>
 <p:sld xmlns:a="http://schemas.openxmlformats.org/drawingml/2006/main" xmlns:r="http://schemas.openxmlformats.org/officeDocument/2006/relationships" xmlns:p="http://schemas.openxmlformats.org/presentationml/2006/main">
   <p:cSld>
     <p:spTree>
@@ -6706,12 +6813,12 @@
           <a:graphicData uri="http://schemas.openxmlformats.org/presentationml/2006/ole">
             <mc:AlternateContent xmlns:mc="http://schemas.openxmlformats.org/markup-compatibility/2006">
               <mc:Choice xmlns:v="urn:schemas-microsoft-com:vml" Requires="v">
-                <p:oleObj spid="_x0000_s8234" name="Worksheet" r:id="rId4" imgW="2448117" imgH="771459" progId="Excel.Sheet.12">
+                <p:oleObj spid="_x0000_s8246" name="Worksheet" r:id="rId3" imgW="2448117" imgH="771459" progId="Excel.Sheet.12">
                   <p:embed/>
                 </p:oleObj>
               </mc:Choice>
               <mc:Fallback>
-                <p:oleObj name="Worksheet" r:id="rId4" imgW="2448117" imgH="771459" progId="Excel.Sheet.12">
+                <p:oleObj name="Worksheet" r:id="rId3" imgW="2448117" imgH="771459" progId="Excel.Sheet.12">
                   <p:embed/>
                   <p:pic>
                     <p:nvPicPr>
@@ -6720,7 +6827,7 @@
                       <p:nvPr/>
                     </p:nvPicPr>
                     <p:blipFill>
-                      <a:blip r:embed="rId5"/>
+                      <a:blip r:embed="rId4"/>
                       <a:stretch>
                         <a:fillRect/>
                       </a:stretch>
@@ -6763,12 +6870,12 @@
           <a:graphicData uri="http://schemas.openxmlformats.org/presentationml/2006/ole">
             <mc:AlternateContent xmlns:mc="http://schemas.openxmlformats.org/markup-compatibility/2006">
               <mc:Choice xmlns:v="urn:schemas-microsoft-com:vml" Requires="v">
-                <p:oleObj spid="_x0000_s8235" name="Worksheet" r:id="rId7" imgW="2448117" imgH="771459" progId="Excel.Sheet.12">
+                <p:oleObj spid="_x0000_s8247" name="Worksheet" r:id="rId5" imgW="2448117" imgH="771459" progId="Excel.Sheet.12">
                   <p:embed/>
                 </p:oleObj>
               </mc:Choice>
               <mc:Fallback>
-                <p:oleObj name="Worksheet" r:id="rId7" imgW="2448117" imgH="771459" progId="Excel.Sheet.12">
+                <p:oleObj name="Worksheet" r:id="rId5" imgW="2448117" imgH="771459" progId="Excel.Sheet.12">
                   <p:embed/>
                   <p:pic>
                     <p:nvPicPr>
@@ -6777,7 +6884,7 @@
                       <p:nvPr/>
                     </p:nvPicPr>
                     <p:blipFill>
-                      <a:blip r:embed="rId8"/>
+                      <a:blip r:embed="rId6"/>
                       <a:stretch>
                         <a:fillRect/>
                       </a:stretch>
@@ -6820,12 +6927,12 @@
           <a:graphicData uri="http://schemas.openxmlformats.org/presentationml/2006/ole">
             <mc:AlternateContent xmlns:mc="http://schemas.openxmlformats.org/markup-compatibility/2006">
               <mc:Choice xmlns:v="urn:schemas-microsoft-com:vml" Requires="v">
-                <p:oleObj spid="_x0000_s8236" name="Worksheet" r:id="rId10" imgW="2448117" imgH="771459" progId="Excel.Sheet.12">
+                <p:oleObj spid="_x0000_s8248" name="Worksheet" r:id="rId7" imgW="2448117" imgH="771459" progId="Excel.Sheet.12">
                   <p:embed/>
                 </p:oleObj>
               </mc:Choice>
               <mc:Fallback>
-                <p:oleObj name="Worksheet" r:id="rId10" imgW="2448117" imgH="771459" progId="Excel.Sheet.12">
+                <p:oleObj name="Worksheet" r:id="rId7" imgW="2448117" imgH="771459" progId="Excel.Sheet.12">
                   <p:embed/>
                   <p:pic>
                     <p:nvPicPr>
@@ -6834,7 +6941,7 @@
                       <p:nvPr/>
                     </p:nvPicPr>
                     <p:blipFill>
-                      <a:blip r:embed="rId11"/>
+                      <a:blip r:embed="rId8"/>
                       <a:stretch>
                         <a:fillRect/>
                       </a:stretch>
@@ -6877,12 +6984,12 @@
           <a:graphicData uri="http://schemas.openxmlformats.org/presentationml/2006/ole">
             <mc:AlternateContent xmlns:mc="http://schemas.openxmlformats.org/markup-compatibility/2006">
               <mc:Choice xmlns:v="urn:schemas-microsoft-com:vml" Requires="v">
-                <p:oleObj spid="_x0000_s8237" name="Worksheet" r:id="rId13" imgW="1838404" imgH="581012" progId="Excel.Sheet.12">
+                <p:oleObj spid="_x0000_s8249" name="Worksheet" r:id="rId9" imgW="1838404" imgH="581012" progId="Excel.Sheet.12">
                   <p:embed/>
                 </p:oleObj>
               </mc:Choice>
               <mc:Fallback>
-                <p:oleObj name="Worksheet" r:id="rId13" imgW="1838404" imgH="581012" progId="Excel.Sheet.12">
+                <p:oleObj name="Worksheet" r:id="rId9" imgW="1838404" imgH="581012" progId="Excel.Sheet.12">
                   <p:embed/>
                   <p:pic>
                     <p:nvPicPr>
@@ -6891,7 +6998,7 @@
                       <p:nvPr/>
                     </p:nvPicPr>
                     <p:blipFill>
-                      <a:blip r:embed="rId14"/>
+                      <a:blip r:embed="rId10"/>
                       <a:stretch>
                         <a:fillRect/>
                       </a:stretch>
@@ -6925,86 +7032,6 @@
 </p:sld>
 </file>
 
-<file path=ppt/slides/slide15.xml><?xml version="1.0" encoding="utf-8"?>
-<p:sld xmlns:a="http://schemas.openxmlformats.org/drawingml/2006/main" xmlns:r="http://schemas.openxmlformats.org/officeDocument/2006/relationships" xmlns:p="http://schemas.openxmlformats.org/presentationml/2006/main">
-  <p:cSld>
-    <p:spTree>
-      <p:nvGrpSpPr>
-        <p:cNvPr id="1" name=""/>
-        <p:cNvGrpSpPr/>
-        <p:nvPr/>
-      </p:nvGrpSpPr>
-      <p:grpSpPr>
-        <a:xfrm>
-          <a:off x="0" y="0"/>
-          <a:ext cx="0" cy="0"/>
-          <a:chOff x="0" y="0"/>
-          <a:chExt cx="0" cy="0"/>
-        </a:xfrm>
-      </p:grpSpPr>
-      <p:sp>
-        <p:nvSpPr>
-          <p:cNvPr id="2" name="Title 1"/>
-          <p:cNvSpPr>
-            <a:spLocks noGrp="1"/>
-          </p:cNvSpPr>
-          <p:nvPr>
-            <p:ph type="title"/>
-          </p:nvPr>
-        </p:nvSpPr>
-        <p:spPr/>
-        <p:txBody>
-          <a:bodyPr/>
-          <a:lstStyle/>
-          <a:p>
-            <a:r>
-              <a:rPr lang="en-US" dirty="0"/>
-              <a:t>Classification - </a:t>
-            </a:r>
-            <a:r>
-              <a:rPr lang="en-US" dirty="0" smtClean="0"/>
-              <a:t>online</a:t>
-            </a:r>
-            <a:endParaRPr lang="en-US" dirty="0"/>
-          </a:p>
-        </p:txBody>
-      </p:sp>
-      <p:sp>
-        <p:nvSpPr>
-          <p:cNvPr id="3" name="Content Placeholder 2"/>
-          <p:cNvSpPr>
-            <a:spLocks noGrp="1"/>
-          </p:cNvSpPr>
-          <p:nvPr>
-            <p:ph idx="1"/>
-          </p:nvPr>
-        </p:nvSpPr>
-        <p:spPr/>
-        <p:txBody>
-          <a:bodyPr/>
-          <a:lstStyle/>
-          <a:p>
-            <a:r>
-              <a:rPr lang="en-US" dirty="0" smtClean="0"/>
-              <a:t>Ahmed, put yours!</a:t>
-            </a:r>
-            <a:endParaRPr lang="en-US" dirty="0"/>
-          </a:p>
-        </p:txBody>
-      </p:sp>
-    </p:spTree>
-    <p:extLst>
-      <p:ext uri="{BB962C8B-B14F-4D97-AF65-F5344CB8AC3E}">
-        <p14:creationId xmlns:p14="http://schemas.microsoft.com/office/powerpoint/2010/main" val="690424562"/>
-      </p:ext>
-    </p:extLst>
-  </p:cSld>
-  <p:clrMapOvr>
-    <a:masterClrMapping/>
-  </p:clrMapOvr>
-</p:sld>
-</file>
-
 <file path=ppt/slides/slide16.xml><?xml version="1.0" encoding="utf-8"?>
 <p:sld xmlns:a="http://schemas.openxmlformats.org/drawingml/2006/main" xmlns:r="http://schemas.openxmlformats.org/officeDocument/2006/relationships" xmlns:p="http://schemas.openxmlformats.org/presentationml/2006/main">
   <p:cSld>
@@ -7037,6 +7064,14 @@
           <a:bodyPr/>
           <a:lstStyle/>
           <a:p>
+            <a:r>
+              <a:rPr lang="en-US" dirty="0"/>
+              <a:t>Classification - </a:t>
+            </a:r>
+            <a:r>
+              <a:rPr lang="en-US" dirty="0" smtClean="0"/>
+              <a:t>online</a:t>
+            </a:r>
             <a:endParaRPr lang="en-US" dirty="0"/>
           </a:p>
         </p:txBody>
@@ -7056,52 +7091,18 @@
           <a:bodyPr/>
           <a:lstStyle/>
           <a:p>
-            <a:endParaRPr lang="en-US"/>
-          </a:p>
-        </p:txBody>
-      </p:sp>
-      <p:sp>
-        <p:nvSpPr>
-          <p:cNvPr id="4" name="Rectangle 3"/>
-          <p:cNvSpPr/>
-          <p:nvPr/>
-        </p:nvSpPr>
-        <p:spPr>
-          <a:xfrm>
-            <a:off x="4644008" y="5796553"/>
-            <a:ext cx="4206315" cy="584775"/>
-          </a:xfrm>
-          <a:prstGeom prst="rect">
-            <a:avLst/>
-          </a:prstGeom>
-        </p:spPr>
-        <p:txBody>
-          <a:bodyPr wrap="square">
-            <a:spAutoFit/>
-          </a:bodyPr>
-          <a:lstStyle/>
-          <a:p>
-            <a:pPr lvl="0" algn="r"/>
-            <a:r>
-              <a:rPr lang="en-US" sz="3200" b="1" dirty="0" smtClean="0">
-                <a:solidFill>
-                  <a:srgbClr val="00477A"/>
-                </a:solidFill>
-              </a:rPr>
-              <a:t>EVALUATION</a:t>
-            </a:r>
-            <a:endParaRPr lang="en-US" sz="3200" b="1" dirty="0">
-              <a:solidFill>
-                <a:srgbClr val="00477A"/>
-              </a:solidFill>
-            </a:endParaRPr>
+            <a:r>
+              <a:rPr lang="en-US" dirty="0" smtClean="0"/>
+              <a:t>Ahmed, put yours!</a:t>
+            </a:r>
+            <a:endParaRPr lang="en-US" dirty="0"/>
           </a:p>
         </p:txBody>
       </p:sp>
     </p:spTree>
     <p:extLst>
       <p:ext uri="{BB962C8B-B14F-4D97-AF65-F5344CB8AC3E}">
-        <p14:creationId xmlns:p14="http://schemas.microsoft.com/office/powerpoint/2010/main" val="3904369150"/>
+        <p14:creationId xmlns:p14="http://schemas.microsoft.com/office/powerpoint/2010/main" val="690424562"/>
       </p:ext>
     </p:extLst>
   </p:cSld>
@@ -7143,7 +7144,7 @@
           <a:bodyPr/>
           <a:lstStyle/>
           <a:p>
-            <a:endParaRPr lang="en-US"/>
+            <a:endParaRPr lang="en-US" dirty="0"/>
           </a:p>
         </p:txBody>
       </p:sp>
@@ -7163,13 +7164,51 @@
           <a:lstStyle/>
           <a:p>
             <a:endParaRPr lang="en-US"/>
+          </a:p>
+        </p:txBody>
+      </p:sp>
+      <p:sp>
+        <p:nvSpPr>
+          <p:cNvPr id="4" name="Rectangle 3"/>
+          <p:cNvSpPr/>
+          <p:nvPr/>
+        </p:nvSpPr>
+        <p:spPr>
+          <a:xfrm>
+            <a:off x="4644008" y="5796553"/>
+            <a:ext cx="4206315" cy="584775"/>
+          </a:xfrm>
+          <a:prstGeom prst="rect">
+            <a:avLst/>
+          </a:prstGeom>
+        </p:spPr>
+        <p:txBody>
+          <a:bodyPr wrap="square">
+            <a:spAutoFit/>
+          </a:bodyPr>
+          <a:lstStyle/>
+          <a:p>
+            <a:pPr lvl="0" algn="r"/>
+            <a:r>
+              <a:rPr lang="en-US" sz="3200" b="1" dirty="0" smtClean="0">
+                <a:solidFill>
+                  <a:srgbClr val="00477A"/>
+                </a:solidFill>
+              </a:rPr>
+              <a:t>EVALUATION</a:t>
+            </a:r>
+            <a:endParaRPr lang="en-US" sz="3200" b="1" dirty="0">
+              <a:solidFill>
+                <a:srgbClr val="00477A"/>
+              </a:solidFill>
+            </a:endParaRPr>
           </a:p>
         </p:txBody>
       </p:sp>
     </p:spTree>
     <p:extLst>
       <p:ext uri="{BB962C8B-B14F-4D97-AF65-F5344CB8AC3E}">
-        <p14:creationId xmlns:p14="http://schemas.microsoft.com/office/powerpoint/2010/main" val="939627613"/>
+        <p14:creationId xmlns:p14="http://schemas.microsoft.com/office/powerpoint/2010/main" val="3904369150"/>
       </p:ext>
     </p:extLst>
   </p:cSld>
@@ -7234,48 +7273,10 @@
           </a:p>
         </p:txBody>
       </p:sp>
-      <p:sp>
-        <p:nvSpPr>
-          <p:cNvPr id="4" name="Rectangle 3"/>
-          <p:cNvSpPr/>
-          <p:nvPr/>
-        </p:nvSpPr>
-        <p:spPr>
-          <a:xfrm>
-            <a:off x="4644008" y="5796553"/>
-            <a:ext cx="4206315" cy="584775"/>
-          </a:xfrm>
-          <a:prstGeom prst="rect">
-            <a:avLst/>
-          </a:prstGeom>
-        </p:spPr>
-        <p:txBody>
-          <a:bodyPr wrap="square">
-            <a:spAutoFit/>
-          </a:bodyPr>
-          <a:lstStyle/>
-          <a:p>
-            <a:pPr lvl="0" algn="r"/>
-            <a:r>
-              <a:rPr lang="en-US" sz="3200" b="1" dirty="0" smtClean="0">
-                <a:solidFill>
-                  <a:srgbClr val="00477A"/>
-                </a:solidFill>
-              </a:rPr>
-              <a:t>PLAN</a:t>
-            </a:r>
-            <a:endParaRPr lang="en-US" sz="3200" b="1" dirty="0">
-              <a:solidFill>
-                <a:srgbClr val="00477A"/>
-              </a:solidFill>
-            </a:endParaRPr>
-          </a:p>
-        </p:txBody>
-      </p:sp>
     </p:spTree>
     <p:extLst>
       <p:ext uri="{BB962C8B-B14F-4D97-AF65-F5344CB8AC3E}">
-        <p14:creationId xmlns:p14="http://schemas.microsoft.com/office/powerpoint/2010/main" val="905835443"/>
+        <p14:creationId xmlns:p14="http://schemas.microsoft.com/office/powerpoint/2010/main" val="939627613"/>
       </p:ext>
     </p:extLst>
   </p:cSld>
@@ -7340,10 +7341,48 @@
           </a:p>
         </p:txBody>
       </p:sp>
+      <p:sp>
+        <p:nvSpPr>
+          <p:cNvPr id="4" name="Rectangle 3"/>
+          <p:cNvSpPr/>
+          <p:nvPr/>
+        </p:nvSpPr>
+        <p:spPr>
+          <a:xfrm>
+            <a:off x="4644008" y="5796553"/>
+            <a:ext cx="4206315" cy="584775"/>
+          </a:xfrm>
+          <a:prstGeom prst="rect">
+            <a:avLst/>
+          </a:prstGeom>
+        </p:spPr>
+        <p:txBody>
+          <a:bodyPr wrap="square">
+            <a:spAutoFit/>
+          </a:bodyPr>
+          <a:lstStyle/>
+          <a:p>
+            <a:pPr lvl="0" algn="r"/>
+            <a:r>
+              <a:rPr lang="en-US" sz="3200" b="1" dirty="0" smtClean="0">
+                <a:solidFill>
+                  <a:srgbClr val="00477A"/>
+                </a:solidFill>
+              </a:rPr>
+              <a:t>PLAN</a:t>
+            </a:r>
+            <a:endParaRPr lang="en-US" sz="3200" b="1" dirty="0">
+              <a:solidFill>
+                <a:srgbClr val="00477A"/>
+              </a:solidFill>
+            </a:endParaRPr>
+          </a:p>
+        </p:txBody>
+      </p:sp>
     </p:spTree>
     <p:extLst>
       <p:ext uri="{BB962C8B-B14F-4D97-AF65-F5344CB8AC3E}">
-        <p14:creationId xmlns:p14="http://schemas.microsoft.com/office/powerpoint/2010/main" val="3553063492"/>
+        <p14:creationId xmlns:p14="http://schemas.microsoft.com/office/powerpoint/2010/main" val="905835443"/>
       </p:ext>
     </p:extLst>
   </p:cSld>
@@ -7490,6 +7529,74 @@
     </p:spTree>
     <p:extLst>
       <p:ext uri="{BB962C8B-B14F-4D97-AF65-F5344CB8AC3E}">
+        <p14:creationId xmlns:p14="http://schemas.microsoft.com/office/powerpoint/2010/main" val="3553063492"/>
+      </p:ext>
+    </p:extLst>
+  </p:cSld>
+  <p:clrMapOvr>
+    <a:masterClrMapping/>
+  </p:clrMapOvr>
+</p:sld>
+</file>
+
+<file path=ppt/slides/slide21.xml><?xml version="1.0" encoding="utf-8"?>
+<p:sld xmlns:a="http://schemas.openxmlformats.org/drawingml/2006/main" xmlns:r="http://schemas.openxmlformats.org/officeDocument/2006/relationships" xmlns:p="http://schemas.openxmlformats.org/presentationml/2006/main">
+  <p:cSld>
+    <p:spTree>
+      <p:nvGrpSpPr>
+        <p:cNvPr id="1" name=""/>
+        <p:cNvGrpSpPr/>
+        <p:nvPr/>
+      </p:nvGrpSpPr>
+      <p:grpSpPr>
+        <a:xfrm>
+          <a:off x="0" y="0"/>
+          <a:ext cx="0" cy="0"/>
+          <a:chOff x="0" y="0"/>
+          <a:chExt cx="0" cy="0"/>
+        </a:xfrm>
+      </p:grpSpPr>
+      <p:sp>
+        <p:nvSpPr>
+          <p:cNvPr id="2" name="Title 1"/>
+          <p:cNvSpPr>
+            <a:spLocks noGrp="1"/>
+          </p:cNvSpPr>
+          <p:nvPr>
+            <p:ph type="title"/>
+          </p:nvPr>
+        </p:nvSpPr>
+        <p:spPr/>
+        <p:txBody>
+          <a:bodyPr/>
+          <a:lstStyle/>
+          <a:p>
+            <a:endParaRPr lang="en-US"/>
+          </a:p>
+        </p:txBody>
+      </p:sp>
+      <p:sp>
+        <p:nvSpPr>
+          <p:cNvPr id="3" name="Content Placeholder 2"/>
+          <p:cNvSpPr>
+            <a:spLocks noGrp="1"/>
+          </p:cNvSpPr>
+          <p:nvPr>
+            <p:ph idx="1"/>
+          </p:nvPr>
+        </p:nvSpPr>
+        <p:spPr/>
+        <p:txBody>
+          <a:bodyPr/>
+          <a:lstStyle/>
+          <a:p>
+            <a:endParaRPr lang="en-US"/>
+          </a:p>
+        </p:txBody>
+      </p:sp>
+    </p:spTree>
+    <p:extLst>
+      <p:ext uri="{BB962C8B-B14F-4D97-AF65-F5344CB8AC3E}">
         <p14:creationId xmlns:p14="http://schemas.microsoft.com/office/powerpoint/2010/main" val="296754017"/>
       </p:ext>
     </p:extLst>
@@ -8042,48 +8149,10 @@
           </a:p>
         </p:txBody>
       </p:sp>
-      <p:sp>
-        <p:nvSpPr>
-          <p:cNvPr id="4" name="Rectangle 3"/>
-          <p:cNvSpPr/>
-          <p:nvPr/>
-        </p:nvSpPr>
-        <p:spPr>
-          <a:xfrm>
-            <a:off x="4644008" y="5796553"/>
-            <a:ext cx="4206315" cy="584775"/>
-          </a:xfrm>
-          <a:prstGeom prst="rect">
-            <a:avLst/>
-          </a:prstGeom>
-        </p:spPr>
-        <p:txBody>
-          <a:bodyPr wrap="square">
-            <a:spAutoFit/>
-          </a:bodyPr>
-          <a:lstStyle/>
-          <a:p>
-            <a:pPr lvl="0" algn="r"/>
-            <a:r>
-              <a:rPr lang="en-US" sz="3200" b="1" dirty="0" smtClean="0">
-                <a:solidFill>
-                  <a:srgbClr val="00477A"/>
-                </a:solidFill>
-              </a:rPr>
-              <a:t>HARDWARE</a:t>
-            </a:r>
-            <a:endParaRPr lang="en-US" sz="3200" b="1" dirty="0">
-              <a:solidFill>
-                <a:srgbClr val="00477A"/>
-              </a:solidFill>
-            </a:endParaRPr>
-          </a:p>
-        </p:txBody>
-      </p:sp>
     </p:spTree>
     <p:extLst>
       <p:ext uri="{BB962C8B-B14F-4D97-AF65-F5344CB8AC3E}">
-        <p14:creationId xmlns:p14="http://schemas.microsoft.com/office/powerpoint/2010/main" val="2124246283"/>
+        <p14:creationId xmlns:p14="http://schemas.microsoft.com/office/powerpoint/2010/main" val="2023392570"/>
       </p:ext>
     </p:extLst>
   </p:cSld>
@@ -8125,7 +8194,7 @@
           <a:bodyPr/>
           <a:lstStyle/>
           <a:p>
-            <a:endParaRPr lang="en-US"/>
+            <a:endParaRPr lang="en-US" dirty="0"/>
           </a:p>
         </p:txBody>
       </p:sp>
@@ -8145,13 +8214,51 @@
           <a:lstStyle/>
           <a:p>
             <a:endParaRPr lang="en-US"/>
+          </a:p>
+        </p:txBody>
+      </p:sp>
+      <p:sp>
+        <p:nvSpPr>
+          <p:cNvPr id="4" name="Rectangle 3"/>
+          <p:cNvSpPr/>
+          <p:nvPr/>
+        </p:nvSpPr>
+        <p:spPr>
+          <a:xfrm>
+            <a:off x="4644008" y="5796553"/>
+            <a:ext cx="4206315" cy="584775"/>
+          </a:xfrm>
+          <a:prstGeom prst="rect">
+            <a:avLst/>
+          </a:prstGeom>
+        </p:spPr>
+        <p:txBody>
+          <a:bodyPr wrap="square">
+            <a:spAutoFit/>
+          </a:bodyPr>
+          <a:lstStyle/>
+          <a:p>
+            <a:pPr lvl="0" algn="r"/>
+            <a:r>
+              <a:rPr lang="en-US" sz="3200" b="1" dirty="0" smtClean="0">
+                <a:solidFill>
+                  <a:srgbClr val="00477A"/>
+                </a:solidFill>
+              </a:rPr>
+              <a:t>HARDWARE</a:t>
+            </a:r>
+            <a:endParaRPr lang="en-US" sz="3200" b="1" dirty="0">
+              <a:solidFill>
+                <a:srgbClr val="00477A"/>
+              </a:solidFill>
+            </a:endParaRPr>
           </a:p>
         </p:txBody>
       </p:sp>
     </p:spTree>
     <p:extLst>
       <p:ext uri="{BB962C8B-B14F-4D97-AF65-F5344CB8AC3E}">
-        <p14:creationId xmlns:p14="http://schemas.microsoft.com/office/powerpoint/2010/main" val="3032751201"/>
+        <p14:creationId xmlns:p14="http://schemas.microsoft.com/office/powerpoint/2010/main" val="2124246283"/>
       </p:ext>
     </p:extLst>
   </p:cSld>
@@ -8216,48 +8323,10 @@
           </a:p>
         </p:txBody>
       </p:sp>
-      <p:sp>
-        <p:nvSpPr>
-          <p:cNvPr id="4" name="Rectangle 3"/>
-          <p:cNvSpPr/>
-          <p:nvPr/>
-        </p:nvSpPr>
-        <p:spPr>
-          <a:xfrm>
-            <a:off x="4644008" y="5796553"/>
-            <a:ext cx="4206315" cy="584775"/>
-          </a:xfrm>
-          <a:prstGeom prst="rect">
-            <a:avLst/>
-          </a:prstGeom>
-        </p:spPr>
-        <p:txBody>
-          <a:bodyPr wrap="square">
-            <a:spAutoFit/>
-          </a:bodyPr>
-          <a:lstStyle/>
-          <a:p>
-            <a:pPr lvl="0" algn="r"/>
-            <a:r>
-              <a:rPr lang="en-US" sz="3200" b="1" dirty="0" smtClean="0">
-                <a:solidFill>
-                  <a:srgbClr val="00477A"/>
-                </a:solidFill>
-              </a:rPr>
-              <a:t>SOFTWARE</a:t>
-            </a:r>
-            <a:endParaRPr lang="en-US" sz="3200" b="1" dirty="0">
-              <a:solidFill>
-                <a:srgbClr val="00477A"/>
-              </a:solidFill>
-            </a:endParaRPr>
-          </a:p>
-        </p:txBody>
-      </p:sp>
     </p:spTree>
     <p:extLst>
       <p:ext uri="{BB962C8B-B14F-4D97-AF65-F5344CB8AC3E}">
-        <p14:creationId xmlns:p14="http://schemas.microsoft.com/office/powerpoint/2010/main" val="991665235"/>
+        <p14:creationId xmlns:p14="http://schemas.microsoft.com/office/powerpoint/2010/main" val="3032751201"/>
       </p:ext>
     </p:extLst>
   </p:cSld>

</xml_diff>